<commit_message>
Avance 2 Oct 2018
</commit_message>
<xml_diff>
--- a/Documentación/Entregables/Propuestas de solución.pptx
+++ b/Documentación/Entregables/Propuestas de solución.pptx
@@ -1066,11 +1066,7 @@
           <a:p>
             <a:r>
               <a:rPr lang="es-CR" baseline="0" dirty="0" smtClean="0"/>
-              <a:t>Argumento que es un consumible</a:t>
-            </a:r>
-            <a:r>
-              <a:rPr lang="es-CR" baseline="0" dirty="0" smtClean="0"/>
-              <a:t>.</a:t>
+              <a:t>Argumento que es un consumible.</a:t>
             </a:r>
           </a:p>
           <a:p>
@@ -10708,11 +10704,7 @@
                     <a:p>
                       <a:r>
                         <a:rPr lang="es-CR" sz="1400" dirty="0" smtClean="0"/>
-                        <a:t>Es auto </a:t>
-                      </a:r>
-                      <a:r>
-                        <a:rPr lang="es-CR" sz="1400" dirty="0" smtClean="0"/>
-                        <a:t>limpiante.</a:t>
+                        <a:t>Es auto limpiante.</a:t>
                       </a:r>
                       <a:endParaRPr lang="es-CR" sz="1400" dirty="0"/>
                     </a:p>
@@ -10751,11 +10743,7 @@
                       </a:r>
                       <a:r>
                         <a:rPr lang="es-CR" sz="1400" baseline="0" dirty="0" smtClean="0"/>
-                        <a:t> dosificación controlada y </a:t>
-                      </a:r>
-                      <a:r>
-                        <a:rPr lang="es-CR" sz="1400" baseline="0" dirty="0" smtClean="0"/>
-                        <a:t>variable.</a:t>
+                        <a:t> dosificación controlada y variable.</a:t>
                       </a:r>
                       <a:endParaRPr lang="es-CR" sz="1400" dirty="0"/>
                     </a:p>
@@ -10790,11 +10778,7 @@
                     <a:p>
                       <a:r>
                         <a:rPr lang="es-CR" sz="1400" dirty="0" smtClean="0"/>
-                        <a:t>Medición “directa” del </a:t>
-                      </a:r>
-                      <a:r>
-                        <a:rPr lang="es-CR" sz="1400" dirty="0" smtClean="0"/>
-                        <a:t>peso.</a:t>
+                        <a:t>Medición “directa” del peso.</a:t>
                       </a:r>
                       <a:endParaRPr lang="es-CR" sz="1400" dirty="0"/>
                     </a:p>
@@ -10833,11 +10817,7 @@
                     <a:p>
                       <a:r>
                         <a:rPr lang="es-CR" sz="1400" dirty="0" smtClean="0"/>
-                        <a:t>Minimiza </a:t>
-                      </a:r>
-                      <a:r>
-                        <a:rPr lang="es-CR" sz="1400" dirty="0" smtClean="0"/>
-                        <a:t>re trabajos</a:t>
+                        <a:t>Minimiza re trabajos</a:t>
                       </a:r>
                       <a:r>
                         <a:rPr lang="es-CR" sz="1400" baseline="0" dirty="0" smtClean="0"/>
@@ -10923,15 +10903,7 @@
                       </a:r>
                       <a:r>
                         <a:rPr lang="es-CR" sz="1400" baseline="0" dirty="0" smtClean="0"/>
-                        <a:t> proteger la tolva de </a:t>
-                      </a:r>
-                      <a:r>
-                        <a:rPr lang="es-CR" sz="1400" baseline="0" dirty="0" smtClean="0"/>
-                        <a:t>romana ante </a:t>
-                      </a:r>
-                      <a:r>
-                        <a:rPr lang="es-CR" sz="1400" baseline="0" dirty="0" smtClean="0"/>
-                        <a:t>golpes o accidentes.</a:t>
+                        <a:t> proteger la tolva de romana ante golpes o accidentes.</a:t>
                       </a:r>
                       <a:endParaRPr lang="es-CR" sz="1400" dirty="0"/>
                     </a:p>
@@ -10966,21 +10938,8 @@
                       </a:r>
                       <a:r>
                         <a:rPr lang="es-CR" sz="1400" baseline="0" dirty="0" smtClean="0"/>
-                        <a:t> el mantenimiento </a:t>
+                        <a:t> el mantenimiento de los aparatos de medición ya que solo es necesario retirar una tolva.</a:t>
                       </a:r>
-                      <a:r>
-                        <a:rPr lang="es-CR" sz="1400" baseline="0" dirty="0" smtClean="0"/>
-                        <a:t>de los aparatos de medición ya </a:t>
-                      </a:r>
-                      <a:r>
-                        <a:rPr lang="es-CR" sz="1400" baseline="0" dirty="0" smtClean="0"/>
-                        <a:t>que solo es necesario retirar </a:t>
-                      </a:r>
-                      <a:r>
-                        <a:rPr lang="es-CR" sz="1400" baseline="0" dirty="0" smtClean="0"/>
-                        <a:t>una tolva.</a:t>
-                      </a:r>
-                      <a:endParaRPr lang="es-CR" sz="1400" baseline="0" dirty="0" smtClean="0"/>
                     </a:p>
                   </a:txBody>
                   <a:tcPr/>
@@ -12198,11 +12157,7 @@
                     <a:p>
                       <a:r>
                         <a:rPr lang="es-CR" sz="1400" dirty="0" smtClean="0"/>
-                        <a:t>Requiere de </a:t>
-                      </a:r>
-                      <a:r>
-                        <a:rPr lang="es-CR" sz="1400" dirty="0" smtClean="0"/>
-                        <a:t>calibraciones</a:t>
+                        <a:t>Requiere de calibraciones</a:t>
                       </a:r>
                       <a:r>
                         <a:rPr lang="es-CR" sz="1400" baseline="0" dirty="0" smtClean="0"/>
@@ -12210,11 +12165,7 @@
                       </a:r>
                       <a:r>
                         <a:rPr lang="es-CR" sz="1400" dirty="0" smtClean="0"/>
-                        <a:t>más </a:t>
-                      </a:r>
-                      <a:r>
-                        <a:rPr lang="es-CR" sz="1400" dirty="0" smtClean="0"/>
-                        <a:t>complejas</a:t>
+                        <a:t>más complejas</a:t>
                       </a:r>
                       <a:endParaRPr lang="es-CR" sz="1400" dirty="0"/>
                     </a:p>
@@ -12535,23 +12486,7 @@
                   <a:schemeClr val="tx1"/>
                 </a:solidFill>
               </a:rPr>
-              <a:t>Los gruesos son dosificados por </a:t>
-            </a:r>
-            <a:r>
-              <a:rPr lang="es-CR" dirty="0" smtClean="0">
-                <a:solidFill>
-                  <a:schemeClr val="tx1"/>
-                </a:solidFill>
-              </a:rPr>
-              <a:t>TSF </a:t>
-            </a:r>
-            <a:r>
-              <a:rPr lang="es-CR" dirty="0" smtClean="0">
-                <a:solidFill>
-                  <a:schemeClr val="tx1"/>
-                </a:solidFill>
-              </a:rPr>
-              <a:t>mientras que los finos por vibradores.</a:t>
+              <a:t>Los gruesos son dosificados por TSF mientras que los finos por vibradores.</a:t>
             </a:r>
           </a:p>
           <a:p>
@@ -12586,23 +12521,7 @@
                   <a:schemeClr val="tx1"/>
                 </a:solidFill>
               </a:rPr>
-              <a:t>Todos los alimentos son recogidos por una gran </a:t>
-            </a:r>
-            <a:r>
-              <a:rPr lang="es-CR" dirty="0" smtClean="0">
-                <a:solidFill>
-                  <a:schemeClr val="tx1"/>
-                </a:solidFill>
-              </a:rPr>
-              <a:t>embudo que </a:t>
-            </a:r>
-            <a:r>
-              <a:rPr lang="es-CR" dirty="0" smtClean="0">
-                <a:solidFill>
-                  <a:schemeClr val="tx1"/>
-                </a:solidFill>
-              </a:rPr>
-              <a:t>los dirige a los tubos por gravedad.</a:t>
+              <a:t>Todos los alimentos son recogidos por una gran embudo que los dirige a los tubos por gravedad.</a:t>
             </a:r>
           </a:p>
           <a:p>
@@ -13540,15 +13459,7 @@
                     <a:p>
                       <a:r>
                         <a:rPr lang="es-CR" sz="1200" dirty="0" smtClean="0"/>
-                        <a:t>De todos los diseño es el más rápido ya que </a:t>
-                      </a:r>
-                      <a:r>
-                        <a:rPr lang="es-CR" sz="1200" dirty="0" smtClean="0"/>
-                        <a:t>dosifica </a:t>
-                      </a:r>
-                      <a:r>
-                        <a:rPr lang="es-CR" sz="1200" dirty="0" smtClean="0"/>
-                        <a:t>simultáneamente.</a:t>
+                        <a:t>De todos los diseño es el más rápido ya que dosifica simultáneamente.</a:t>
                       </a:r>
                       <a:endParaRPr lang="es-CR" sz="1200" dirty="0"/>
                     </a:p>
@@ -13609,11 +13520,7 @@
                       </a:r>
                       <a:r>
                         <a:rPr lang="es-CR" sz="1200" baseline="0" dirty="0" smtClean="0"/>
-                        <a:t> (desde 300 a 1 000 USD usados en </a:t>
-                      </a:r>
-                      <a:r>
-                        <a:rPr lang="es-CR" sz="1200" baseline="0" dirty="0" smtClean="0"/>
-                        <a:t>eBay).</a:t>
+                        <a:t> (desde 300 a 1 000 USD usados en eBay).</a:t>
                       </a:r>
                       <a:endParaRPr lang="es-CR" sz="1400" dirty="0"/>
                     </a:p>
@@ -14063,15 +13970,7 @@
                   <a:schemeClr val="tx1"/>
                 </a:solidFill>
               </a:rPr>
-              <a:t>Programas </a:t>
-            </a:r>
-            <a:r>
-              <a:rPr lang="es-CR" sz="2800" dirty="0" smtClean="0">
-                <a:solidFill>
-                  <a:schemeClr val="tx1"/>
-                </a:solidFill>
-              </a:rPr>
-              <a:t>del MICITT</a:t>
+              <a:t>Programas del MICITT</a:t>
             </a:r>
           </a:p>
           <a:p>
@@ -14095,11 +13994,6 @@
               </a:rPr>
               <a:t>PITS</a:t>
             </a:r>
-            <a:endParaRPr lang="es-CR" sz="2600" dirty="0" smtClean="0">
-              <a:solidFill>
-                <a:schemeClr val="tx1"/>
-              </a:solidFill>
-            </a:endParaRPr>
           </a:p>
           <a:p>
             <a:r>
@@ -14352,75 +14246,30 @@
                   <a:schemeClr val="tx1"/>
                 </a:solidFill>
               </a:rPr>
-              <a:t>Tener</a:t>
-            </a:r>
-            <a:r>
-              <a:rPr lang="es-MX" b="1" dirty="0" smtClean="0">
+              <a:t>Tener alianza con algún centro de desarrollo tecnológico.</a:t>
+            </a:r>
+          </a:p>
+          <a:p>
+            <a:pPr lvl="1"/>
+            <a:r>
+              <a:rPr lang="es-MX" dirty="0" smtClean="0">
                 <a:solidFill>
                   <a:schemeClr val="tx1"/>
                 </a:solidFill>
               </a:rPr>
-              <a:t> </a:t>
-            </a:r>
-            <a:r>
-              <a:rPr lang="es-MX" b="1" dirty="0" smtClean="0">
+              <a:t>Ser Pyme inscrita ante el MEIC.</a:t>
+            </a:r>
+          </a:p>
+          <a:p>
+            <a:pPr lvl="1"/>
+            <a:r>
+              <a:rPr lang="es-CR" dirty="0" smtClean="0">
                 <a:solidFill>
                   <a:schemeClr val="tx1"/>
                 </a:solidFill>
               </a:rPr>
-              <a:t>alianza con algún centro de desarrollo tecnológico.</a:t>
-            </a:r>
-          </a:p>
-          <a:p>
-            <a:pPr lvl="1"/>
-            <a:r>
-              <a:rPr lang="es-MX" dirty="0" smtClean="0">
-                <a:solidFill>
-                  <a:schemeClr val="tx1"/>
-                </a:solidFill>
-              </a:rPr>
-              <a:t>Ser </a:t>
-            </a:r>
-            <a:r>
-              <a:rPr lang="es-MX" dirty="0" smtClean="0">
-                <a:solidFill>
-                  <a:schemeClr val="tx1"/>
-                </a:solidFill>
-              </a:rPr>
-              <a:t>Pyme </a:t>
-            </a:r>
-            <a:r>
-              <a:rPr lang="es-MX" dirty="0" smtClean="0">
-                <a:solidFill>
-                  <a:schemeClr val="tx1"/>
-                </a:solidFill>
-              </a:rPr>
-              <a:t>inscrita ante el MEIC.</a:t>
-            </a:r>
-          </a:p>
-          <a:p>
-            <a:pPr lvl="1"/>
-            <a:r>
-              <a:rPr lang="es-CR" dirty="0" smtClean="0">
-                <a:solidFill>
-                  <a:schemeClr val="tx1"/>
-                </a:solidFill>
-              </a:rPr>
-              <a:t>Estar al día </a:t>
-            </a:r>
-            <a:r>
-              <a:rPr lang="es-CR" dirty="0" smtClean="0">
-                <a:solidFill>
-                  <a:schemeClr val="tx1"/>
-                </a:solidFill>
-              </a:rPr>
-              <a:t>con responsabilidades tributarias.</a:t>
-            </a:r>
-            <a:endParaRPr lang="es-CR" dirty="0" smtClean="0">
-              <a:solidFill>
-                <a:schemeClr val="tx1"/>
-              </a:solidFill>
-            </a:endParaRPr>
+              <a:t>Estar al día con responsabilidades tributarias.</a:t>
+            </a:r>
           </a:p>
           <a:p>
             <a:pPr lvl="1"/>
@@ -14462,37 +14311,8 @@
                   <a:schemeClr val="tx1"/>
                 </a:solidFill>
               </a:rPr>
-              <a:t>Financiamiento hasta </a:t>
-            </a:r>
-            <a:r>
-              <a:rPr lang="es-CR" dirty="0" smtClean="0">
-                <a:solidFill>
-                  <a:schemeClr val="tx1"/>
-                </a:solidFill>
-              </a:rPr>
-              <a:t>el </a:t>
-            </a:r>
-            <a:r>
-              <a:rPr lang="es-CR" dirty="0" smtClean="0">
-                <a:solidFill>
-                  <a:schemeClr val="tx1"/>
-                </a:solidFill>
-              </a:rPr>
-              <a:t>80% </a:t>
-            </a:r>
-            <a:r>
-              <a:rPr lang="es-CR" dirty="0" smtClean="0">
-                <a:solidFill>
-                  <a:schemeClr val="tx1"/>
-                </a:solidFill>
-              </a:rPr>
-              <a:t>del costo del proyecto.</a:t>
-            </a:r>
-            <a:endParaRPr lang="es-CR" dirty="0" smtClean="0">
-              <a:solidFill>
-                <a:schemeClr val="tx1"/>
-              </a:solidFill>
-            </a:endParaRPr>
+              <a:t>Financiamiento hasta el 80% del costo del proyecto.</a:t>
+            </a:r>
           </a:p>
           <a:p>
             <a:pPr lvl="1"/>
@@ -14513,23 +14333,7 @@
                   <a:schemeClr val="tx1"/>
                 </a:solidFill>
               </a:rPr>
-              <a:t>Duración máxima del proyecto </a:t>
-            </a:r>
-            <a:r>
-              <a:rPr lang="es-CR" dirty="0" smtClean="0">
-                <a:solidFill>
-                  <a:schemeClr val="tx1"/>
-                </a:solidFill>
-              </a:rPr>
-              <a:t>es de 24 </a:t>
-            </a:r>
-            <a:r>
-              <a:rPr lang="es-CR" dirty="0" smtClean="0">
-                <a:solidFill>
-                  <a:schemeClr val="tx1"/>
-                </a:solidFill>
-              </a:rPr>
-              <a:t>meses.</a:t>
+              <a:t>Duración máxima del proyecto es de 24 meses.</a:t>
             </a:r>
             <a:endParaRPr lang="es-CR" dirty="0">
               <a:solidFill>
@@ -14677,31 +14481,7 @@
                   <a:schemeClr val="tx1"/>
                 </a:solidFill>
               </a:rPr>
-              <a:t>Iniciativa del </a:t>
-            </a:r>
-            <a:r>
-              <a:rPr lang="es-MX" dirty="0" smtClean="0">
-                <a:solidFill>
-                  <a:schemeClr val="tx1"/>
-                </a:solidFill>
-              </a:rPr>
-              <a:t>MICITT </a:t>
-            </a:r>
-            <a:r>
-              <a:rPr lang="es-MX" dirty="0" smtClean="0">
-                <a:solidFill>
-                  <a:schemeClr val="tx1"/>
-                </a:solidFill>
-              </a:rPr>
-              <a:t>ejecutado por </a:t>
-            </a:r>
-            <a:r>
-              <a:rPr lang="es-MX" dirty="0" smtClean="0">
-                <a:solidFill>
-                  <a:schemeClr val="tx1"/>
-                </a:solidFill>
-              </a:rPr>
-              <a:t>la UCR</a:t>
+              <a:t>Iniciativa del MICITT ejecutado por la UCR</a:t>
             </a:r>
           </a:p>
           <a:p>
@@ -14713,11 +14493,6 @@
               </a:rPr>
               <a:t>Fomento de proyectos y empresas tecnológicas en diferentes sectores</a:t>
             </a:r>
-            <a:endParaRPr lang="es-MX" dirty="0" smtClean="0">
-              <a:solidFill>
-                <a:schemeClr val="tx1"/>
-              </a:solidFill>
-            </a:endParaRPr>
           </a:p>
           <a:p>
             <a:r>
@@ -14756,15 +14531,7 @@
                   <a:schemeClr val="tx1"/>
                 </a:solidFill>
               </a:rPr>
-              <a:t>networking</a:t>
-            </a:r>
-            <a:r>
-              <a:rPr lang="es-CR" i="1" dirty="0" smtClean="0">
-                <a:solidFill>
-                  <a:schemeClr val="tx1"/>
-                </a:solidFill>
-              </a:rPr>
-              <a:t> </a:t>
+              <a:t>networking </a:t>
             </a:r>
             <a:r>
               <a:rPr lang="es-CR" dirty="0" smtClean="0">
@@ -14801,11 +14568,6 @@
               </a:rPr>
               <a:t>” para optar por recursos de MICITT y SBD. (Mes de Agosto)</a:t>
             </a:r>
-            <a:endParaRPr lang="es-CR" dirty="0" smtClean="0">
-              <a:solidFill>
-                <a:schemeClr val="tx1"/>
-              </a:solidFill>
-            </a:endParaRPr>
           </a:p>
         </p:txBody>
       </p:sp>
@@ -14980,11 +14742,6 @@
               </a:rPr>
               <a:t>Puntos clave.</a:t>
             </a:r>
-            <a:endParaRPr lang="es-CR" sz="2200" dirty="0">
-              <a:solidFill>
-                <a:schemeClr val="tx1"/>
-              </a:solidFill>
-            </a:endParaRPr>
           </a:p>
           <a:p>
             <a:pPr lvl="1"/>
@@ -15132,73 +14889,17 @@
                   <a:schemeClr val="tx1"/>
                 </a:solidFill>
               </a:rPr>
-              <a:t>Los alimentos se almacenan en tolvas separadas, </a:t>
-            </a:r>
+              <a:t>Los alimentos se almacenan en tolvas separadas, la del concentrado y adicional podrían tener una pared divisoria.</a:t>
+            </a:r>
+          </a:p>
+          <a:p>
             <a:r>
               <a:rPr lang="es-CR" sz="2000" dirty="0" smtClean="0">
                 <a:solidFill>
                   <a:schemeClr val="tx1"/>
                 </a:solidFill>
               </a:rPr>
-              <a:t>la del </a:t>
-            </a:r>
-            <a:r>
-              <a:rPr lang="es-CR" sz="2000" dirty="0" smtClean="0">
-                <a:solidFill>
-                  <a:schemeClr val="tx1"/>
-                </a:solidFill>
-              </a:rPr>
-              <a:t>concentrado y adicional </a:t>
-            </a:r>
-            <a:r>
-              <a:rPr lang="es-CR" sz="2000" dirty="0" smtClean="0">
-                <a:solidFill>
-                  <a:schemeClr val="tx1"/>
-                </a:solidFill>
-              </a:rPr>
-              <a:t>podrían tener una </a:t>
-            </a:r>
-            <a:r>
-              <a:rPr lang="es-CR" sz="2000" dirty="0" smtClean="0">
-                <a:solidFill>
-                  <a:schemeClr val="tx1"/>
-                </a:solidFill>
-              </a:rPr>
-              <a:t>pared divisoria.</a:t>
-            </a:r>
-          </a:p>
-          <a:p>
-            <a:r>
-              <a:rPr lang="es-CR" sz="2000" dirty="0" smtClean="0">
-                <a:solidFill>
-                  <a:schemeClr val="tx1"/>
-                </a:solidFill>
-              </a:rPr>
-              <a:t>Estos son </a:t>
-            </a:r>
-            <a:r>
-              <a:rPr lang="es-CR" sz="2000" dirty="0" smtClean="0">
-                <a:solidFill>
-                  <a:schemeClr val="tx1"/>
-                </a:solidFill>
-              </a:rPr>
-              <a:t>transportados por un TSF con ligera inclinación y </a:t>
-            </a:r>
-            <a:r>
-              <a:rPr lang="es-CR" sz="2000" dirty="0" smtClean="0">
-                <a:solidFill>
-                  <a:schemeClr val="tx1"/>
-                </a:solidFill>
-              </a:rPr>
-              <a:t>medidos en </a:t>
-            </a:r>
-            <a:r>
-              <a:rPr lang="es-CR" sz="2000" dirty="0" smtClean="0">
-                <a:solidFill>
-                  <a:schemeClr val="tx1"/>
-                </a:solidFill>
-              </a:rPr>
-              <a:t>una tolva por sumatoria.</a:t>
+              <a:t>Estos son transportados por un TSF con ligera inclinación y medidos en una tolva por sumatoria.</a:t>
             </a:r>
           </a:p>
           <a:p>
@@ -15427,21 +15128,8 @@
                   <a:schemeClr val="tx1"/>
                 </a:solidFill>
               </a:rPr>
-              <a:t>Comenzar a dosificar el concentrado </a:t>
-            </a:r>
-            <a:r>
-              <a:rPr lang="es-CR" dirty="0" smtClean="0">
-                <a:solidFill>
-                  <a:schemeClr val="tx1"/>
-                </a:solidFill>
-              </a:rPr>
-              <a:t>con el TSF.</a:t>
-            </a:r>
-            <a:endParaRPr lang="es-CR" dirty="0" smtClean="0">
-              <a:solidFill>
-                <a:schemeClr val="tx1"/>
-              </a:solidFill>
-            </a:endParaRPr>
+              <a:t>Comenzar a dosificar el concentrado con el TSF.</a:t>
+            </a:r>
           </a:p>
           <a:p>
             <a:pPr lvl="1"/>

</xml_diff>